<commit_message>
Put more detail and re-write the function
</commit_message>
<xml_diff>
--- a/AdaDelta & Adam Algorithm.pptx
+++ b/AdaDelta & Adam Algorithm.pptx
@@ -325,7 +325,7 @@
             <a:fld id="{1D8BD707-D9CF-40AE-B4C6-C98DA3205C09}" type="datetimeFigureOut">
               <a:rPr lang="en-US" smtClean="0"/>
               <a:pPr/>
-              <a:t>8/1/2025</a:t>
+              <a:t>8/2/2025</a:t>
             </a:fld>
             <a:endParaRPr lang="en-US"/>
           </a:p>
@@ -490,7 +490,7 @@
             <a:fld id="{1D8BD707-D9CF-40AE-B4C6-C98DA3205C09}" type="datetimeFigureOut">
               <a:rPr lang="en-US" smtClean="0"/>
               <a:pPr/>
-              <a:t>8/1/2025</a:t>
+              <a:t>8/2/2025</a:t>
             </a:fld>
             <a:endParaRPr lang="en-US"/>
           </a:p>
@@ -665,7 +665,7 @@
             <a:fld id="{1D8BD707-D9CF-40AE-B4C6-C98DA3205C09}" type="datetimeFigureOut">
               <a:rPr lang="en-US" smtClean="0"/>
               <a:pPr/>
-              <a:t>8/1/2025</a:t>
+              <a:t>8/2/2025</a:t>
             </a:fld>
             <a:endParaRPr lang="en-US"/>
           </a:p>
@@ -830,7 +830,7 @@
             <a:fld id="{1D8BD707-D9CF-40AE-B4C6-C98DA3205C09}" type="datetimeFigureOut">
               <a:rPr lang="en-US" smtClean="0"/>
               <a:pPr/>
-              <a:t>8/1/2025</a:t>
+              <a:t>8/2/2025</a:t>
             </a:fld>
             <a:endParaRPr lang="en-US"/>
           </a:p>
@@ -1072,7 +1072,7 @@
             <a:fld id="{1D8BD707-D9CF-40AE-B4C6-C98DA3205C09}" type="datetimeFigureOut">
               <a:rPr lang="en-US" smtClean="0"/>
               <a:pPr/>
-              <a:t>8/1/2025</a:t>
+              <a:t>8/2/2025</a:t>
             </a:fld>
             <a:endParaRPr lang="en-US"/>
           </a:p>
@@ -1354,7 +1354,7 @@
             <a:fld id="{1D8BD707-D9CF-40AE-B4C6-C98DA3205C09}" type="datetimeFigureOut">
               <a:rPr lang="en-US" smtClean="0"/>
               <a:pPr/>
-              <a:t>8/1/2025</a:t>
+              <a:t>8/2/2025</a:t>
             </a:fld>
             <a:endParaRPr lang="en-US"/>
           </a:p>
@@ -1770,7 +1770,7 @@
             <a:fld id="{1D8BD707-D9CF-40AE-B4C6-C98DA3205C09}" type="datetimeFigureOut">
               <a:rPr lang="en-US" smtClean="0"/>
               <a:pPr/>
-              <a:t>8/1/2025</a:t>
+              <a:t>8/2/2025</a:t>
             </a:fld>
             <a:endParaRPr lang="en-US"/>
           </a:p>
@@ -1884,7 +1884,7 @@
             <a:fld id="{1D8BD707-D9CF-40AE-B4C6-C98DA3205C09}" type="datetimeFigureOut">
               <a:rPr lang="en-US" smtClean="0"/>
               <a:pPr/>
-              <a:t>8/1/2025</a:t>
+              <a:t>8/2/2025</a:t>
             </a:fld>
             <a:endParaRPr lang="en-US"/>
           </a:p>
@@ -1976,7 +1976,7 @@
             <a:fld id="{1D8BD707-D9CF-40AE-B4C6-C98DA3205C09}" type="datetimeFigureOut">
               <a:rPr lang="en-US" smtClean="0"/>
               <a:pPr/>
-              <a:t>8/1/2025</a:t>
+              <a:t>8/2/2025</a:t>
             </a:fld>
             <a:endParaRPr lang="en-US"/>
           </a:p>
@@ -2248,7 +2248,7 @@
             <a:fld id="{1D8BD707-D9CF-40AE-B4C6-C98DA3205C09}" type="datetimeFigureOut">
               <a:rPr lang="en-US" smtClean="0"/>
               <a:pPr/>
-              <a:t>8/1/2025</a:t>
+              <a:t>8/2/2025</a:t>
             </a:fld>
             <a:endParaRPr lang="en-US"/>
           </a:p>
@@ -2497,7 +2497,7 @@
             <a:fld id="{1D8BD707-D9CF-40AE-B4C6-C98DA3205C09}" type="datetimeFigureOut">
               <a:rPr lang="en-US" smtClean="0"/>
               <a:pPr/>
-              <a:t>8/1/2025</a:t>
+              <a:t>8/2/2025</a:t>
             </a:fld>
             <a:endParaRPr lang="en-US"/>
           </a:p>
@@ -2705,7 +2705,7 @@
             <a:fld id="{1D8BD707-D9CF-40AE-B4C6-C98DA3205C09}" type="datetimeFigureOut">
               <a:rPr lang="en-US" smtClean="0"/>
               <a:pPr/>
-              <a:t>8/1/2025</a:t>
+              <a:t>8/2/2025</a:t>
             </a:fld>
             <a:endParaRPr lang="en-US"/>
           </a:p>
@@ -4070,7 +4070,10 @@
           <a:bodyPr/>
           <a:lstStyle/>
           <a:p>
-            <a:endParaRPr lang="en-GB"/>
+            <a:r>
+              <a:rPr lang="en-GB" dirty="0"/>
+              <a:t>5</a:t>
+            </a:r>
           </a:p>
         </p:txBody>
       </p:sp>

</xml_diff>